<commit_message>
Update LTDC config based on datasheet
</commit_message>
<xml_diff>
--- a/Presenation.pptx
+++ b/Presenation.pptx
@@ -5,22 +5,25 @@
     <p:sldMasterId id="2147483648" r:id="rId1"/>
   </p:sldMasterIdLst>
   <p:notesMasterIdLst>
-    <p:notesMasterId r:id="rId15"/>
+    <p:notesMasterId r:id="rId18"/>
   </p:notesMasterIdLst>
   <p:sldIdLst>
     <p:sldId id="256" r:id="rId2"/>
     <p:sldId id="257" r:id="rId3"/>
     <p:sldId id="258" r:id="rId4"/>
-    <p:sldId id="263" r:id="rId5"/>
-    <p:sldId id="259" r:id="rId6"/>
+    <p:sldId id="273" r:id="rId5"/>
+    <p:sldId id="263" r:id="rId6"/>
     <p:sldId id="260" r:id="rId7"/>
-    <p:sldId id="268" r:id="rId8"/>
-    <p:sldId id="269" r:id="rId9"/>
-    <p:sldId id="267" r:id="rId10"/>
-    <p:sldId id="265" r:id="rId11"/>
-    <p:sldId id="270" r:id="rId12"/>
-    <p:sldId id="266" r:id="rId13"/>
-    <p:sldId id="264" r:id="rId14"/>
+    <p:sldId id="259" r:id="rId8"/>
+    <p:sldId id="271" r:id="rId9"/>
+    <p:sldId id="268" r:id="rId10"/>
+    <p:sldId id="269" r:id="rId11"/>
+    <p:sldId id="267" r:id="rId12"/>
+    <p:sldId id="264" r:id="rId13"/>
+    <p:sldId id="265" r:id="rId14"/>
+    <p:sldId id="270" r:id="rId15"/>
+    <p:sldId id="266" r:id="rId16"/>
+    <p:sldId id="272" r:id="rId17"/>
   </p:sldIdLst>
   <p:sldSz cx="9144000" cy="6858000" type="screen4x3"/>
   <p:notesSz cx="6858000" cy="9144000"/>
@@ -204,7 +207,8 @@
           <a:p>
             <a:fld id="{A2B7CEFC-AA97-4249-A47A-FC92A5A1EFB2}" type="datetimeFigureOut">
               <a:rPr lang="pl-PL" smtClean="0"/>
-              <a:t>21.05.2023</a:t>
+              <a:pPr/>
+              <a:t>22.05.2023</a:t>
             </a:fld>
             <a:endParaRPr lang="pl-PL"/>
           </a:p>
@@ -365,6 +369,7 @@
           <a:p>
             <a:fld id="{2E119433-815C-41C2-A5E7-F8B2392C3E25}" type="slidenum">
               <a:rPr lang="pl-PL" smtClean="0"/>
+              <a:pPr/>
               <a:t>‹#›</a:t>
             </a:fld>
             <a:endParaRPr lang="pl-PL"/>
@@ -536,6 +541,7 @@
           <a:p>
             <a:fld id="{2E119433-815C-41C2-A5E7-F8B2392C3E25}" type="slidenum">
               <a:rPr lang="pl-PL" smtClean="0"/>
+              <a:pPr/>
               <a:t>2</a:t>
             </a:fld>
             <a:endParaRPr lang="pl-PL"/>
@@ -732,7 +738,7 @@
             <a:fld id="{66221E02-25CB-4963-84BC-0813985E7D90}" type="datetimeFigureOut">
               <a:rPr lang="pl-PL" smtClean="0"/>
               <a:pPr/>
-              <a:t>21.05.2023</a:t>
+              <a:t>22.05.2023</a:t>
             </a:fld>
             <a:endParaRPr lang="pl-PL"/>
           </a:p>
@@ -899,7 +905,7 @@
             <a:fld id="{66221E02-25CB-4963-84BC-0813985E7D90}" type="datetimeFigureOut">
               <a:rPr lang="pl-PL" smtClean="0"/>
               <a:pPr/>
-              <a:t>21.05.2023</a:t>
+              <a:t>22.05.2023</a:t>
             </a:fld>
             <a:endParaRPr lang="pl-PL"/>
           </a:p>
@@ -1076,7 +1082,7 @@
             <a:fld id="{66221E02-25CB-4963-84BC-0813985E7D90}" type="datetimeFigureOut">
               <a:rPr lang="pl-PL" smtClean="0"/>
               <a:pPr/>
-              <a:t>21.05.2023</a:t>
+              <a:t>22.05.2023</a:t>
             </a:fld>
             <a:endParaRPr lang="pl-PL"/>
           </a:p>
@@ -1243,7 +1249,7 @@
             <a:fld id="{66221E02-25CB-4963-84BC-0813985E7D90}" type="datetimeFigureOut">
               <a:rPr lang="pl-PL" smtClean="0"/>
               <a:pPr/>
-              <a:t>21.05.2023</a:t>
+              <a:t>22.05.2023</a:t>
             </a:fld>
             <a:endParaRPr lang="pl-PL"/>
           </a:p>
@@ -1486,7 +1492,7 @@
             <a:fld id="{66221E02-25CB-4963-84BC-0813985E7D90}" type="datetimeFigureOut">
               <a:rPr lang="pl-PL" smtClean="0"/>
               <a:pPr/>
-              <a:t>21.05.2023</a:t>
+              <a:t>22.05.2023</a:t>
             </a:fld>
             <a:endParaRPr lang="pl-PL"/>
           </a:p>
@@ -1771,7 +1777,7 @@
             <a:fld id="{66221E02-25CB-4963-84BC-0813985E7D90}" type="datetimeFigureOut">
               <a:rPr lang="pl-PL" smtClean="0"/>
               <a:pPr/>
-              <a:t>21.05.2023</a:t>
+              <a:t>22.05.2023</a:t>
             </a:fld>
             <a:endParaRPr lang="pl-PL"/>
           </a:p>
@@ -2190,7 +2196,7 @@
             <a:fld id="{66221E02-25CB-4963-84BC-0813985E7D90}" type="datetimeFigureOut">
               <a:rPr lang="pl-PL" smtClean="0"/>
               <a:pPr/>
-              <a:t>21.05.2023</a:t>
+              <a:t>22.05.2023</a:t>
             </a:fld>
             <a:endParaRPr lang="pl-PL"/>
           </a:p>
@@ -2305,7 +2311,7 @@
             <a:fld id="{66221E02-25CB-4963-84BC-0813985E7D90}" type="datetimeFigureOut">
               <a:rPr lang="pl-PL" smtClean="0"/>
               <a:pPr/>
-              <a:t>21.05.2023</a:t>
+              <a:t>22.05.2023</a:t>
             </a:fld>
             <a:endParaRPr lang="pl-PL"/>
           </a:p>
@@ -2397,7 +2403,7 @@
             <a:fld id="{66221E02-25CB-4963-84BC-0813985E7D90}" type="datetimeFigureOut">
               <a:rPr lang="pl-PL" smtClean="0"/>
               <a:pPr/>
-              <a:t>21.05.2023</a:t>
+              <a:t>22.05.2023</a:t>
             </a:fld>
             <a:endParaRPr lang="pl-PL"/>
           </a:p>
@@ -2671,7 +2677,7 @@
             <a:fld id="{66221E02-25CB-4963-84BC-0813985E7D90}" type="datetimeFigureOut">
               <a:rPr lang="pl-PL" smtClean="0"/>
               <a:pPr/>
-              <a:t>21.05.2023</a:t>
+              <a:t>22.05.2023</a:t>
             </a:fld>
             <a:endParaRPr lang="pl-PL"/>
           </a:p>
@@ -2921,7 +2927,7 @@
             <a:fld id="{66221E02-25CB-4963-84BC-0813985E7D90}" type="datetimeFigureOut">
               <a:rPr lang="pl-PL" smtClean="0"/>
               <a:pPr/>
-              <a:t>21.05.2023</a:t>
+              <a:t>22.05.2023</a:t>
             </a:fld>
             <a:endParaRPr lang="pl-PL"/>
           </a:p>
@@ -3131,7 +3137,7 @@
             <a:fld id="{66221E02-25CB-4963-84BC-0813985E7D90}" type="datetimeFigureOut">
               <a:rPr lang="pl-PL" smtClean="0"/>
               <a:pPr/>
-              <a:t>21.05.2023</a:t>
+              <a:t>22.05.2023</a:t>
             </a:fld>
             <a:endParaRPr lang="pl-PL"/>
           </a:p>
@@ -3814,28 +3820,42 @@
         </p:nvSpPr>
         <p:spPr/>
         <p:txBody>
-          <a:bodyPr/>
+          <a:bodyPr>
+            <a:normAutofit fontScale="90000"/>
+          </a:bodyPr>
           <a:lstStyle/>
           <a:p>
             <a:r>
               <a:rPr lang="pl-PL" dirty="0" err="1" smtClean="0"/>
-              <a:t>Prepared</a:t>
+              <a:t>Quad</a:t>
             </a:r>
             <a:r>
               <a:rPr lang="pl-PL" dirty="0" smtClean="0"/>
               <a:t> </a:t>
             </a:r>
             <a:r>
+              <a:rPr lang="pl-PL" dirty="0" smtClean="0"/>
+              <a:t>Serial </a:t>
+            </a:r>
+            <a:r>
               <a:rPr lang="pl-PL" dirty="0" err="1" smtClean="0"/>
-              <a:t>example</a:t>
+              <a:t>periph</a:t>
             </a:r>
             <a:r>
               <a:rPr lang="pl-PL" dirty="0" smtClean="0"/>
-              <a:t> - </a:t>
+              <a:t>. </a:t>
             </a:r>
             <a:r>
               <a:rPr lang="pl-PL" dirty="0" err="1" smtClean="0"/>
-              <a:t>compilation</a:t>
+              <a:t>Interface</a:t>
+            </a:r>
+            <a:r>
+              <a:rPr lang="pl-PL" dirty="0" smtClean="0"/>
+              <a:t> (</a:t>
+            </a:r>
+            <a:r>
+              <a:rPr lang="pl-PL" dirty="0" smtClean="0"/>
+              <a:t>QSPI)</a:t>
             </a:r>
             <a:endParaRPr lang="pl-PL" dirty="0"/>
           </a:p>
@@ -3853,129 +3873,10 @@
         </p:nvSpPr>
         <p:spPr/>
         <p:txBody>
-          <a:bodyPr>
-            <a:normAutofit fontScale="77500" lnSpcReduction="20000"/>
-          </a:bodyPr>
-          <a:lstStyle/>
-          <a:p>
-            <a:r>
-              <a:rPr lang="pl-PL" dirty="0" smtClean="0"/>
-              <a:t>Zadbaj o następujące programy:</a:t>
-            </a:r>
-            <a:endParaRPr lang="pl-PL" dirty="0" smtClean="0"/>
-          </a:p>
-          <a:p>
-            <a:pPr>
-              <a:buNone/>
-            </a:pPr>
-            <a:r>
-              <a:rPr lang="pl-PL" dirty="0" smtClean="0"/>
-              <a:t/>
-            </a:r>
-            <a:br>
-              <a:rPr lang="pl-PL" dirty="0" smtClean="0"/>
-            </a:br>
-            <a:r>
-              <a:rPr lang="pl-PL" dirty="0" smtClean="0"/>
-              <a:t>    * </a:t>
-            </a:r>
-            <a:r>
-              <a:rPr lang="pl-PL" dirty="0" err="1" smtClean="0"/>
-              <a:t>arm-none-eabi-gcc</a:t>
-            </a:r>
-            <a:r>
-              <a:rPr lang="pl-PL" dirty="0" smtClean="0"/>
-              <a:t> 9.3.1</a:t>
-            </a:r>
-          </a:p>
-          <a:p>
-            <a:r>
-              <a:rPr lang="pl-PL" dirty="0" smtClean="0"/>
-              <a:t>    * </a:t>
-            </a:r>
-            <a:r>
-              <a:rPr lang="pl-PL" dirty="0" err="1" smtClean="0"/>
-              <a:t>OpenOCD</a:t>
-            </a:r>
-            <a:r>
-              <a:rPr lang="pl-PL" dirty="0" smtClean="0"/>
-              <a:t> 0.11.0</a:t>
-            </a:r>
-          </a:p>
-          <a:p>
-            <a:r>
-              <a:rPr lang="pl-PL" dirty="0" smtClean="0"/>
-              <a:t>    * make 4.2.1 / </a:t>
-            </a:r>
-            <a:r>
-              <a:rPr lang="pl-PL" dirty="0" err="1" smtClean="0"/>
-              <a:t>or</a:t>
-            </a:r>
-            <a:r>
-              <a:rPr lang="pl-PL" dirty="0" smtClean="0"/>
-              <a:t> 3.81</a:t>
-            </a:r>
-          </a:p>
-          <a:p>
-            <a:r>
-              <a:rPr lang="pl-PL" dirty="0" smtClean="0"/>
-              <a:t>    * STM32_Programmer_CLI</a:t>
-            </a:r>
-          </a:p>
-          <a:p>
-            <a:r>
-              <a:rPr lang="pl-PL" dirty="0" smtClean="0"/>
-              <a:t>    * </a:t>
-            </a:r>
-            <a:r>
-              <a:rPr lang="pl-PL" dirty="0" err="1" smtClean="0"/>
-              <a:t>Account</a:t>
-            </a:r>
-            <a:r>
-              <a:rPr lang="pl-PL" dirty="0" smtClean="0"/>
-              <a:t> </a:t>
-            </a:r>
-            <a:r>
-              <a:rPr lang="pl-PL" dirty="0" err="1" smtClean="0"/>
-              <a:t>Variable</a:t>
-            </a:r>
-            <a:r>
-              <a:rPr lang="pl-PL" dirty="0" smtClean="0"/>
-              <a:t> </a:t>
-            </a:r>
-            <a:r>
-              <a:rPr lang="pl-PL" dirty="0" smtClean="0"/>
-              <a:t>to STM32_CubeProgrammer: </a:t>
-            </a:r>
-            <a:r>
-              <a:rPr lang="pl-PL" dirty="0" smtClean="0"/>
-              <a:t>STM32_CubeProgrammerPATH eg. </a:t>
-            </a:r>
-            <a:r>
-              <a:rPr lang="pl-PL" dirty="0" err="1" smtClean="0"/>
-              <a:t>path</a:t>
-            </a:r>
-            <a:r>
-              <a:rPr lang="pl-PL" dirty="0" smtClean="0"/>
-              <a:t>: D:\STMicroelectronics\STM32Cube\STM32CubeProgrammer\bin</a:t>
-            </a:r>
-            <a:endParaRPr lang="pl-PL" dirty="0" smtClean="0"/>
-          </a:p>
-          <a:p>
-            <a:pPr>
-              <a:buNone/>
-            </a:pPr>
-            <a:r>
-              <a:rPr lang="pl-PL" dirty="0" smtClean="0"/>
-              <a:t/>
-            </a:r>
-            <a:br>
-              <a:rPr lang="pl-PL" dirty="0" smtClean="0"/>
-            </a:br>
-            <a:endParaRPr lang="pl-PL" dirty="0" smtClean="0"/>
-          </a:p>
-          <a:p>
-            <a:endParaRPr lang="pl-PL" dirty="0"/>
+          <a:bodyPr/>
+          <a:lstStyle/>
+          <a:p>
+            <a:endParaRPr lang="pl-PL"/>
           </a:p>
         </p:txBody>
       </p:sp>
@@ -4020,41 +3921,86 @@
           <a:lstStyle/>
           <a:p>
             <a:r>
-              <a:rPr lang="pl-PL" dirty="0" err="1" smtClean="0"/>
-              <a:t>Prepared</a:t>
+              <a:rPr lang="pl-PL" dirty="0" err="1" smtClean="0">
+                <a:solidFill>
+                  <a:srgbClr val="7C7F07"/>
+                </a:solidFill>
+              </a:rPr>
+              <a:t>DLTuc</a:t>
+            </a:r>
+            <a:r>
+              <a:rPr lang="pl-PL" dirty="0" smtClean="0">
+                <a:solidFill>
+                  <a:srgbClr val="7C7F07"/>
+                </a:solidFill>
+              </a:rPr>
+              <a:t> </a:t>
+            </a:r>
+            <a:r>
+              <a:rPr lang="pl-PL" dirty="0" err="1" smtClean="0">
+                <a:solidFill>
+                  <a:srgbClr val="7C7F07"/>
+                </a:solidFill>
+              </a:rPr>
+              <a:t>Library</a:t>
+            </a:r>
+            <a:endParaRPr lang="pl-PL" dirty="0">
+              <a:solidFill>
+                <a:srgbClr val="7C7F07"/>
+              </a:solidFill>
+            </a:endParaRPr>
+          </a:p>
+        </p:txBody>
+      </p:sp>
+      <p:sp>
+        <p:nvSpPr>
+          <p:cNvPr id="3" name="Symbol zastępczy zawartości 2"/>
+          <p:cNvSpPr>
+            <a:spLocks noGrp="1"/>
+          </p:cNvSpPr>
+          <p:nvPr>
+            <p:ph idx="1"/>
+          </p:nvPr>
+        </p:nvSpPr>
+        <p:spPr>
+          <a:xfrm>
+            <a:off x="357158" y="2857496"/>
+            <a:ext cx="8229600" cy="642942"/>
+          </a:xfrm>
+        </p:spPr>
+        <p:txBody>
+          <a:bodyPr>
+            <a:normAutofit/>
+          </a:bodyPr>
+          <a:lstStyle/>
+          <a:p>
+            <a:pPr>
+              <a:buNone/>
+            </a:pPr>
+            <a:r>
+              <a:rPr lang="pl-PL" dirty="0" smtClean="0">
+                <a:hlinkClick r:id="rId2"/>
+              </a:rPr>
+              <a:t>https://youtu.be/WWnudktQlP0</a:t>
             </a:r>
             <a:r>
               <a:rPr lang="pl-PL" dirty="0" smtClean="0"/>
               <a:t> </a:t>
             </a:r>
-            <a:r>
-              <a:rPr lang="pl-PL" dirty="0" err="1" smtClean="0"/>
-              <a:t>example</a:t>
-            </a:r>
-            <a:r>
-              <a:rPr lang="pl-PL" dirty="0" smtClean="0"/>
-              <a:t> </a:t>
-            </a:r>
-            <a:r>
-              <a:rPr lang="pl-PL" dirty="0" smtClean="0"/>
-              <a:t>– kod w QSPI</a:t>
-            </a:r>
             <a:endParaRPr lang="pl-PL" dirty="0"/>
           </a:p>
         </p:txBody>
       </p:sp>
       <p:pic>
         <p:nvPicPr>
-          <p:cNvPr id="4098" name="Picture 2"/>
+          <p:cNvPr id="3075" name="Picture 3"/>
           <p:cNvPicPr>
-            <a:picLocks noGrp="1" noChangeAspect="1" noChangeArrowheads="1"/>
+            <a:picLocks noChangeAspect="1" noChangeArrowheads="1"/>
           </p:cNvPicPr>
-          <p:nvPr>
-            <p:ph idx="1"/>
-          </p:nvPr>
+          <p:nvPr/>
         </p:nvPicPr>
         <p:blipFill>
-          <a:blip r:embed="rId2"/>
+          <a:blip r:embed="rId3"/>
           <a:srcRect/>
           <a:stretch>
             <a:fillRect/>
@@ -4062,8 +4008,8 @@
         </p:blipFill>
         <p:spPr bwMode="auto">
           <a:xfrm>
-            <a:off x="1428728" y="2071678"/>
-            <a:ext cx="6357950" cy="3579125"/>
+            <a:off x="2643174" y="4143380"/>
+            <a:ext cx="6154737" cy="2209800"/>
           </a:xfrm>
           <a:prstGeom prst="rect">
             <a:avLst/>
@@ -4078,6 +4024,36 @@
           <a:effectLst/>
         </p:spPr>
       </p:pic>
+      <p:sp>
+        <p:nvSpPr>
+          <p:cNvPr id="6" name="pole tekstowe 5"/>
+          <p:cNvSpPr txBox="1"/>
+          <p:nvPr/>
+        </p:nvSpPr>
+        <p:spPr>
+          <a:xfrm>
+            <a:off x="357158" y="2285992"/>
+            <a:ext cx="6643734" cy="369332"/>
+          </a:xfrm>
+          <a:prstGeom prst="rect">
+            <a:avLst/>
+          </a:prstGeom>
+          <a:noFill/>
+        </p:spPr>
+        <p:txBody>
+          <a:bodyPr wrap="square" rtlCol="0">
+            <a:spAutoFit/>
+          </a:bodyPr>
+          <a:lstStyle/>
+          <a:p>
+            <a:r>
+              <a:rPr lang="pl-PL" smtClean="0"/>
+              <a:t>Uproszczenie procesu rozwoju oprogramowania wbudowanego</a:t>
+            </a:r>
+            <a:endParaRPr lang="pl-PL" dirty="0" smtClean="0"/>
+          </a:p>
+        </p:txBody>
+      </p:sp>
     </p:spTree>
   </p:cSld>
   <p:clrMapOvr>
@@ -4115,6 +4091,524 @@
         </p:nvSpPr>
         <p:spPr>
           <a:xfrm>
+            <a:off x="142844" y="357166"/>
+            <a:ext cx="5900750" cy="917596"/>
+          </a:xfrm>
+        </p:spPr>
+        <p:txBody>
+          <a:bodyPr/>
+          <a:lstStyle/>
+          <a:p>
+            <a:r>
+              <a:rPr lang="pl-PL" dirty="0" smtClean="0"/>
+              <a:t>Przygotowany przykład</a:t>
+            </a:r>
+            <a:endParaRPr lang="pl-PL" dirty="0"/>
+          </a:p>
+        </p:txBody>
+      </p:sp>
+      <p:sp>
+        <p:nvSpPr>
+          <p:cNvPr id="3" name="Symbol zastępczy zawartości 2"/>
+          <p:cNvSpPr>
+            <a:spLocks noGrp="1"/>
+          </p:cNvSpPr>
+          <p:nvPr>
+            <p:ph idx="1"/>
+          </p:nvPr>
+        </p:nvSpPr>
+        <p:spPr/>
+        <p:txBody>
+          <a:bodyPr>
+            <a:normAutofit/>
+          </a:bodyPr>
+          <a:lstStyle/>
+          <a:p>
+            <a:pPr>
+              <a:buNone/>
+            </a:pPr>
+            <a:r>
+              <a:rPr lang="pl-PL" sz="1800" b="1" dirty="0" smtClean="0"/>
+              <a:t>	</a:t>
+            </a:r>
+          </a:p>
+          <a:p>
+            <a:pPr>
+              <a:buNone/>
+            </a:pPr>
+            <a:endParaRPr lang="pl-PL" sz="1800" b="1" dirty="0" smtClean="0"/>
+          </a:p>
+          <a:p>
+            <a:pPr>
+              <a:buNone/>
+            </a:pPr>
+            <a:endParaRPr lang="pl-PL" sz="1800" b="1" dirty="0" smtClean="0"/>
+          </a:p>
+          <a:p>
+            <a:pPr>
+              <a:buNone/>
+            </a:pPr>
+            <a:endParaRPr lang="pl-PL" sz="1800" b="1" dirty="0" smtClean="0"/>
+          </a:p>
+          <a:p>
+            <a:pPr>
+              <a:buNone/>
+            </a:pPr>
+            <a:endParaRPr lang="pl-PL" sz="1800" b="1" dirty="0" smtClean="0"/>
+          </a:p>
+          <a:p>
+            <a:pPr>
+              <a:buNone/>
+            </a:pPr>
+            <a:endParaRPr lang="pl-PL" sz="1800" b="1" dirty="0" smtClean="0"/>
+          </a:p>
+          <a:p>
+            <a:pPr>
+              <a:buNone/>
+            </a:pPr>
+            <a:r>
+              <a:rPr lang="pl-PL" sz="1800" b="1" dirty="0" smtClean="0"/>
+              <a:t>	</a:t>
+            </a:r>
+            <a:r>
+              <a:rPr lang="pl-PL" sz="1800" b="1" dirty="0" err="1" smtClean="0"/>
+              <a:t>Github</a:t>
+            </a:r>
+            <a:r>
+              <a:rPr lang="pl-PL" sz="1800" b="1" dirty="0" smtClean="0"/>
+              <a:t>:</a:t>
+            </a:r>
+            <a:r>
+              <a:rPr lang="pl-PL" sz="1800" dirty="0" smtClean="0"/>
+              <a:t/>
+            </a:r>
+            <a:br>
+              <a:rPr lang="pl-PL" sz="1800" dirty="0" smtClean="0"/>
+            </a:br>
+            <a:r>
+              <a:rPr lang="pl-PL" sz="1800" dirty="0" smtClean="0">
+                <a:hlinkClick r:id="rId2"/>
+              </a:rPr>
+              <a:t>https://github.com/trteodor/stm32h747_disco_lvgl_bare_metal</a:t>
+            </a:r>
+            <a:r>
+              <a:rPr lang="pl-PL" sz="1800" dirty="0" smtClean="0"/>
+              <a:t> </a:t>
+            </a:r>
+          </a:p>
+          <a:p>
+            <a:pPr>
+              <a:buNone/>
+            </a:pPr>
+            <a:r>
+              <a:rPr lang="pl-PL" sz="1800" dirty="0" smtClean="0"/>
+              <a:t/>
+            </a:r>
+            <a:br>
+              <a:rPr lang="pl-PL" sz="1800" dirty="0" smtClean="0"/>
+            </a:br>
+            <a:r>
+              <a:rPr lang="pl-PL" sz="1800" b="1" dirty="0" err="1" smtClean="0"/>
+              <a:t>Free</a:t>
+            </a:r>
+            <a:r>
+              <a:rPr lang="pl-PL" sz="1800" b="1" dirty="0" smtClean="0"/>
+              <a:t> </a:t>
+            </a:r>
+            <a:r>
+              <a:rPr lang="pl-PL" sz="1800" b="1" dirty="0" err="1" smtClean="0"/>
+              <a:t>Icons</a:t>
+            </a:r>
+            <a:r>
+              <a:rPr lang="pl-PL" sz="1800" b="1" dirty="0" smtClean="0"/>
+              <a:t>:</a:t>
+            </a:r>
+            <a:r>
+              <a:rPr lang="pl-PL" sz="1800" dirty="0" smtClean="0"/>
+              <a:t/>
+            </a:r>
+            <a:br>
+              <a:rPr lang="pl-PL" sz="1800" dirty="0" smtClean="0"/>
+            </a:br>
+            <a:r>
+              <a:rPr lang="pl-PL" sz="1800" dirty="0" smtClean="0">
+                <a:hlinkClick r:id="rId3"/>
+              </a:rPr>
+              <a:t>https://all-free-download.com/free-icon/pack-jpeg.html</a:t>
+            </a:r>
+            <a:r>
+              <a:rPr lang="pl-PL" sz="1800" dirty="0" smtClean="0"/>
+              <a:t/>
+            </a:r>
+            <a:br>
+              <a:rPr lang="pl-PL" sz="1800" dirty="0" smtClean="0"/>
+            </a:br>
+            <a:r>
+              <a:rPr lang="pl-PL" sz="1800" dirty="0" smtClean="0"/>
+              <a:t/>
+            </a:r>
+            <a:br>
+              <a:rPr lang="pl-PL" sz="1800" dirty="0" smtClean="0"/>
+            </a:br>
+            <a:r>
+              <a:rPr lang="pl-PL" sz="1800" b="1" dirty="0" err="1" smtClean="0"/>
+              <a:t>Benchmark</a:t>
+            </a:r>
+            <a:r>
+              <a:rPr lang="pl-PL" sz="1800" b="1" dirty="0" smtClean="0"/>
+              <a:t> video show:</a:t>
+            </a:r>
+            <a:r>
+              <a:rPr lang="pl-PL" sz="1800" dirty="0" smtClean="0"/>
+              <a:t/>
+            </a:r>
+            <a:br>
+              <a:rPr lang="pl-PL" sz="1800" dirty="0" smtClean="0"/>
+            </a:br>
+            <a:r>
+              <a:rPr lang="pl-PL" sz="1800" dirty="0" smtClean="0">
+                <a:hlinkClick r:id="rId4"/>
+              </a:rPr>
+              <a:t>https://youtu.be/5MxftdVXUOgd</a:t>
+            </a:r>
+            <a:endParaRPr lang="pl-PL" sz="1800" dirty="0"/>
+          </a:p>
+        </p:txBody>
+      </p:sp>
+      <p:pic>
+        <p:nvPicPr>
+          <p:cNvPr id="4" name="Picture 7" descr="D:\STM32_VSCodeWorkSpace\stm32h747_lvgl_master_start\Pictures\h747lvgl_Photo.jpg"/>
+          <p:cNvPicPr>
+            <a:picLocks noChangeAspect="1" noChangeArrowheads="1"/>
+          </p:cNvPicPr>
+          <p:nvPr/>
+        </p:nvPicPr>
+        <p:blipFill>
+          <a:blip r:embed="rId5" cstate="print"/>
+          <a:srcRect/>
+          <a:stretch>
+            <a:fillRect/>
+          </a:stretch>
+        </p:blipFill>
+        <p:spPr bwMode="auto">
+          <a:xfrm rot="2918870">
+            <a:off x="6022854" y="1156940"/>
+            <a:ext cx="2665556" cy="2025083"/>
+          </a:xfrm>
+          <a:prstGeom prst="rect">
+            <a:avLst/>
+          </a:prstGeom>
+          <a:noFill/>
+        </p:spPr>
+      </p:pic>
+    </p:spTree>
+  </p:cSld>
+  <p:clrMapOvr>
+    <a:masterClrMapping/>
+  </p:clrMapOvr>
+</p:sld>
+</file>
+
+<file path=ppt/slides/slide13.xml><?xml version="1.0" encoding="utf-8"?>
+<p:sld xmlns:a="http://schemas.openxmlformats.org/drawingml/2006/main" xmlns:r="http://schemas.openxmlformats.org/officeDocument/2006/relationships" xmlns:p="http://schemas.openxmlformats.org/presentationml/2006/main">
+  <p:cSld>
+    <p:spTree>
+      <p:nvGrpSpPr>
+        <p:cNvPr id="1" name=""/>
+        <p:cNvGrpSpPr/>
+        <p:nvPr/>
+      </p:nvGrpSpPr>
+      <p:grpSpPr>
+        <a:xfrm>
+          <a:off x="0" y="0"/>
+          <a:ext cx="0" cy="0"/>
+          <a:chOff x="0" y="0"/>
+          <a:chExt cx="0" cy="0"/>
+        </a:xfrm>
+      </p:grpSpPr>
+      <p:sp>
+        <p:nvSpPr>
+          <p:cNvPr id="2" name="Tytuł 1"/>
+          <p:cNvSpPr>
+            <a:spLocks noGrp="1"/>
+          </p:cNvSpPr>
+          <p:nvPr>
+            <p:ph type="title"/>
+          </p:nvPr>
+        </p:nvSpPr>
+        <p:spPr/>
+        <p:txBody>
+          <a:bodyPr>
+            <a:normAutofit fontScale="90000"/>
+          </a:bodyPr>
+          <a:lstStyle/>
+          <a:p>
+            <a:r>
+              <a:rPr lang="pl-PL" dirty="0" smtClean="0"/>
+              <a:t>Przygotowany przykład - </a:t>
+            </a:r>
+            <a:r>
+              <a:rPr lang="pl-PL" dirty="0" smtClean="0"/>
+              <a:t>kompilowanie</a:t>
+            </a:r>
+            <a:endParaRPr lang="pl-PL" dirty="0"/>
+          </a:p>
+        </p:txBody>
+      </p:sp>
+      <p:sp>
+        <p:nvSpPr>
+          <p:cNvPr id="3" name="Symbol zastępczy zawartości 2"/>
+          <p:cNvSpPr>
+            <a:spLocks noGrp="1"/>
+          </p:cNvSpPr>
+          <p:nvPr>
+            <p:ph idx="1"/>
+          </p:nvPr>
+        </p:nvSpPr>
+        <p:spPr/>
+        <p:txBody>
+          <a:bodyPr>
+            <a:normAutofit fontScale="77500" lnSpcReduction="20000"/>
+          </a:bodyPr>
+          <a:lstStyle/>
+          <a:p>
+            <a:r>
+              <a:rPr lang="pl-PL" dirty="0" smtClean="0"/>
+              <a:t>Zadbaj o następujące programy:</a:t>
+            </a:r>
+          </a:p>
+          <a:p>
+            <a:pPr>
+              <a:buNone/>
+            </a:pPr>
+            <a:r>
+              <a:rPr lang="pl-PL" dirty="0" smtClean="0"/>
+              <a:t/>
+            </a:r>
+            <a:br>
+              <a:rPr lang="pl-PL" dirty="0" smtClean="0"/>
+            </a:br>
+            <a:r>
+              <a:rPr lang="pl-PL" dirty="0" smtClean="0"/>
+              <a:t>    * </a:t>
+            </a:r>
+            <a:r>
+              <a:rPr lang="pl-PL" dirty="0" err="1" smtClean="0"/>
+              <a:t>arm-none-eabi-gcc</a:t>
+            </a:r>
+            <a:r>
+              <a:rPr lang="pl-PL" dirty="0" smtClean="0"/>
+              <a:t> 9.3.1</a:t>
+            </a:r>
+          </a:p>
+          <a:p>
+            <a:r>
+              <a:rPr lang="pl-PL" dirty="0" smtClean="0"/>
+              <a:t>    * </a:t>
+            </a:r>
+            <a:r>
+              <a:rPr lang="pl-PL" dirty="0" err="1" smtClean="0"/>
+              <a:t>OpenOCD</a:t>
+            </a:r>
+            <a:r>
+              <a:rPr lang="pl-PL" dirty="0" smtClean="0"/>
+              <a:t> 0.11.0</a:t>
+            </a:r>
+          </a:p>
+          <a:p>
+            <a:r>
+              <a:rPr lang="pl-PL" dirty="0" smtClean="0"/>
+              <a:t>    * make 4.2.1 / </a:t>
+            </a:r>
+            <a:r>
+              <a:rPr lang="pl-PL" dirty="0" err="1" smtClean="0"/>
+              <a:t>or</a:t>
+            </a:r>
+            <a:r>
+              <a:rPr lang="pl-PL" dirty="0" smtClean="0"/>
+              <a:t> 3.81</a:t>
+            </a:r>
+          </a:p>
+          <a:p>
+            <a:r>
+              <a:rPr lang="pl-PL" dirty="0" smtClean="0"/>
+              <a:t>    * STM32_Programmer_CLI</a:t>
+            </a:r>
+          </a:p>
+          <a:p>
+            <a:r>
+              <a:rPr lang="pl-PL" dirty="0" smtClean="0"/>
+              <a:t>    * </a:t>
+            </a:r>
+            <a:r>
+              <a:rPr lang="pl-PL" dirty="0" err="1" smtClean="0"/>
+              <a:t>Account</a:t>
+            </a:r>
+            <a:r>
+              <a:rPr lang="pl-PL" dirty="0" smtClean="0"/>
+              <a:t> </a:t>
+            </a:r>
+            <a:r>
+              <a:rPr lang="pl-PL" dirty="0" err="1" smtClean="0"/>
+              <a:t>Variable</a:t>
+            </a:r>
+            <a:r>
+              <a:rPr lang="pl-PL" dirty="0" smtClean="0"/>
+              <a:t> to STM32_CubeProgrammer: STM32_CubeProgrammerPATH eg. </a:t>
+            </a:r>
+            <a:r>
+              <a:rPr lang="pl-PL" dirty="0" err="1" smtClean="0"/>
+              <a:t>path</a:t>
+            </a:r>
+            <a:r>
+              <a:rPr lang="pl-PL" dirty="0" smtClean="0"/>
+              <a:t>: D:\STMicroelectronics\STM32Cube\STM32CubeProgrammer\bin</a:t>
+            </a:r>
+          </a:p>
+          <a:p>
+            <a:pPr>
+              <a:buNone/>
+            </a:pPr>
+            <a:r>
+              <a:rPr lang="pl-PL" dirty="0" smtClean="0"/>
+              <a:t/>
+            </a:r>
+            <a:br>
+              <a:rPr lang="pl-PL" dirty="0" smtClean="0"/>
+            </a:br>
+            <a:endParaRPr lang="pl-PL" dirty="0" smtClean="0"/>
+          </a:p>
+          <a:p>
+            <a:endParaRPr lang="pl-PL" dirty="0"/>
+          </a:p>
+        </p:txBody>
+      </p:sp>
+    </p:spTree>
+  </p:cSld>
+  <p:clrMapOvr>
+    <a:masterClrMapping/>
+  </p:clrMapOvr>
+</p:sld>
+</file>
+
+<file path=ppt/slides/slide14.xml><?xml version="1.0" encoding="utf-8"?>
+<p:sld xmlns:a="http://schemas.openxmlformats.org/drawingml/2006/main" xmlns:r="http://schemas.openxmlformats.org/officeDocument/2006/relationships" xmlns:p="http://schemas.openxmlformats.org/presentationml/2006/main">
+  <p:cSld>
+    <p:spTree>
+      <p:nvGrpSpPr>
+        <p:cNvPr id="1" name=""/>
+        <p:cNvGrpSpPr/>
+        <p:nvPr/>
+      </p:nvGrpSpPr>
+      <p:grpSpPr>
+        <a:xfrm>
+          <a:off x="0" y="0"/>
+          <a:ext cx="0" cy="0"/>
+          <a:chOff x="0" y="0"/>
+          <a:chExt cx="0" cy="0"/>
+        </a:xfrm>
+      </p:grpSpPr>
+      <p:sp>
+        <p:nvSpPr>
+          <p:cNvPr id="2" name="Tytuł 1"/>
+          <p:cNvSpPr>
+            <a:spLocks noGrp="1"/>
+          </p:cNvSpPr>
+          <p:nvPr>
+            <p:ph type="title"/>
+          </p:nvPr>
+        </p:nvSpPr>
+        <p:spPr/>
+        <p:txBody>
+          <a:bodyPr>
+            <a:normAutofit fontScale="90000"/>
+          </a:bodyPr>
+          <a:lstStyle/>
+          <a:p>
+            <a:r>
+              <a:rPr lang="pl-PL" dirty="0" smtClean="0"/>
+              <a:t>Przygotowany przykład – fragmenty kodu </a:t>
+            </a:r>
+            <a:r>
+              <a:rPr lang="pl-PL" dirty="0" smtClean="0"/>
+              <a:t>w QSPI</a:t>
+            </a:r>
+            <a:endParaRPr lang="pl-PL" dirty="0"/>
+          </a:p>
+        </p:txBody>
+      </p:sp>
+      <p:pic>
+        <p:nvPicPr>
+          <p:cNvPr id="4098" name="Picture 2"/>
+          <p:cNvPicPr>
+            <a:picLocks noGrp="1" noChangeAspect="1" noChangeArrowheads="1"/>
+          </p:cNvPicPr>
+          <p:nvPr>
+            <p:ph idx="1"/>
+          </p:nvPr>
+        </p:nvPicPr>
+        <p:blipFill>
+          <a:blip r:embed="rId2"/>
+          <a:srcRect/>
+          <a:stretch>
+            <a:fillRect/>
+          </a:stretch>
+        </p:blipFill>
+        <p:spPr bwMode="auto">
+          <a:xfrm>
+            <a:off x="2500298" y="2357430"/>
+            <a:ext cx="6357950" cy="3579125"/>
+          </a:xfrm>
+          <a:prstGeom prst="rect">
+            <a:avLst/>
+          </a:prstGeom>
+          <a:noFill/>
+          <a:ln w="9525">
+            <a:noFill/>
+            <a:miter lim="800000"/>
+            <a:headEnd/>
+            <a:tailEnd/>
+          </a:ln>
+          <a:effectLst/>
+        </p:spPr>
+      </p:pic>
+    </p:spTree>
+  </p:cSld>
+  <p:clrMapOvr>
+    <a:masterClrMapping/>
+  </p:clrMapOvr>
+</p:sld>
+</file>
+
+<file path=ppt/slides/slide15.xml><?xml version="1.0" encoding="utf-8"?>
+<p:sld xmlns:a="http://schemas.openxmlformats.org/drawingml/2006/main" xmlns:r="http://schemas.openxmlformats.org/officeDocument/2006/relationships" xmlns:p="http://schemas.openxmlformats.org/presentationml/2006/main">
+  <p:cSld>
+    <p:spTree>
+      <p:nvGrpSpPr>
+        <p:cNvPr id="1" name=""/>
+        <p:cNvGrpSpPr/>
+        <p:nvPr/>
+      </p:nvGrpSpPr>
+      <p:grpSpPr>
+        <a:xfrm>
+          <a:off x="0" y="0"/>
+          <a:ext cx="0" cy="0"/>
+          <a:chOff x="0" y="0"/>
+          <a:chExt cx="0" cy="0"/>
+        </a:xfrm>
+      </p:grpSpPr>
+      <p:sp>
+        <p:nvSpPr>
+          <p:cNvPr id="2" name="Tytuł 1"/>
+          <p:cNvSpPr>
+            <a:spLocks noGrp="1"/>
+          </p:cNvSpPr>
+          <p:nvPr>
+            <p:ph type="title"/>
+          </p:nvPr>
+        </p:nvSpPr>
+        <p:spPr>
+          <a:xfrm>
             <a:off x="142844" y="274638"/>
             <a:ext cx="8543956" cy="1143000"/>
           </a:xfrm>
@@ -4126,36 +4620,12 @@
           <a:lstStyle/>
           <a:p>
             <a:r>
-              <a:rPr lang="pl-PL" dirty="0" err="1" smtClean="0"/>
-              <a:t>Prepared</a:t>
-            </a:r>
-            <a:r>
               <a:rPr lang="pl-PL" dirty="0" smtClean="0"/>
-              <a:t> </a:t>
-            </a:r>
-            <a:r>
-              <a:rPr lang="pl-PL" dirty="0" err="1" smtClean="0"/>
-              <a:t>example</a:t>
+              <a:t>Przygotowany przykład </a:t>
             </a:r>
             <a:r>
               <a:rPr lang="pl-PL" dirty="0" smtClean="0"/>
-              <a:t> </a:t>
-            </a:r>
-            <a:r>
-              <a:rPr lang="pl-PL" dirty="0" smtClean="0"/>
-              <a:t>- </a:t>
-            </a:r>
-            <a:r>
-              <a:rPr lang="pl-PL" dirty="0" err="1" smtClean="0"/>
-              <a:t>Flashing</a:t>
-            </a:r>
-            <a:r>
-              <a:rPr lang="pl-PL" dirty="0" smtClean="0"/>
-              <a:t> and </a:t>
-            </a:r>
-            <a:r>
-              <a:rPr lang="pl-PL" dirty="0" err="1" smtClean="0"/>
-              <a:t>testing</a:t>
+              <a:t> -Programowanie i testowanie</a:t>
             </a:r>
             <a:endParaRPr lang="pl-PL" dirty="0"/>
           </a:p>
@@ -4195,7 +4665,7 @@
         </p:nvSpPr>
         <p:spPr>
           <a:xfrm>
-            <a:off x="857224" y="2500306"/>
+            <a:off x="857224" y="2714620"/>
             <a:ext cx="2340321" cy="369332"/>
           </a:xfrm>
           <a:prstGeom prst="rect">
@@ -4233,7 +4703,7 @@
 </p:sld>
 </file>
 
-<file path=ppt/slides/slide13.xml><?xml version="1.0" encoding="utf-8"?>
+<file path=ppt/slides/slide16.xml><?xml version="1.0" encoding="utf-8"?>
 <p:sld xmlns:a="http://schemas.openxmlformats.org/drawingml/2006/main" xmlns:r="http://schemas.openxmlformats.org/officeDocument/2006/relationships" xmlns:p="http://schemas.openxmlformats.org/presentationml/2006/main">
   <p:cSld>
     <p:spTree>
@@ -4260,27 +4730,14 @@
             <p:ph type="title"/>
           </p:nvPr>
         </p:nvSpPr>
-        <p:spPr>
-          <a:xfrm>
-            <a:off x="142844" y="357166"/>
-            <a:ext cx="5900750" cy="917596"/>
-          </a:xfrm>
-        </p:spPr>
+        <p:spPr/>
         <p:txBody>
           <a:bodyPr/>
           <a:lstStyle/>
           <a:p>
             <a:r>
-              <a:rPr lang="pl-PL" dirty="0" err="1" smtClean="0"/>
-              <a:t>Prepared</a:t>
-            </a:r>
-            <a:r>
               <a:rPr lang="pl-PL" dirty="0" smtClean="0"/>
-              <a:t> </a:t>
-            </a:r>
-            <a:r>
-              <a:rPr lang="pl-PL" dirty="0" err="1" smtClean="0"/>
-              <a:t>example</a:t>
+              <a:t>Podsumowanie</a:t>
             </a:r>
             <a:endParaRPr lang="pl-PL" dirty="0"/>
           </a:p>
@@ -4303,197 +4760,50 @@
           </a:bodyPr>
           <a:lstStyle/>
           <a:p>
-            <a:pPr>
-              <a:buNone/>
-            </a:pPr>
-            <a:r>
-              <a:rPr lang="pl-PL" sz="1800" b="1" dirty="0" smtClean="0"/>
-              <a:t>	</a:t>
-            </a:r>
-          </a:p>
-          <a:p>
-            <a:pPr>
-              <a:buNone/>
-            </a:pPr>
-            <a:endParaRPr lang="pl-PL" sz="1800" b="1" dirty="0" smtClean="0"/>
-          </a:p>
-          <a:p>
-            <a:pPr>
-              <a:buNone/>
-            </a:pPr>
-            <a:endParaRPr lang="pl-PL" sz="1800" b="1" dirty="0" smtClean="0"/>
-          </a:p>
-          <a:p>
-            <a:pPr>
-              <a:buNone/>
-            </a:pPr>
-            <a:endParaRPr lang="pl-PL" sz="1800" b="1" dirty="0" smtClean="0"/>
-          </a:p>
-          <a:p>
-            <a:pPr>
-              <a:buNone/>
-            </a:pPr>
-            <a:endParaRPr lang="pl-PL" sz="1800" b="1" dirty="0" smtClean="0"/>
-          </a:p>
-          <a:p>
-            <a:pPr>
-              <a:buNone/>
-            </a:pPr>
-            <a:endParaRPr lang="pl-PL" sz="1800" b="1" dirty="0" smtClean="0"/>
-          </a:p>
-          <a:p>
-            <a:pPr>
-              <a:buNone/>
-            </a:pPr>
-            <a:r>
-              <a:rPr lang="pl-PL" sz="1800" b="1" dirty="0" smtClean="0"/>
-              <a:t>	</a:t>
-            </a:r>
-            <a:r>
-              <a:rPr lang="pl-PL" sz="1800" b="1" dirty="0" err="1" smtClean="0"/>
-              <a:t>Github</a:t>
-            </a:r>
-            <a:r>
-              <a:rPr lang="pl-PL" sz="1800" b="1" dirty="0" smtClean="0"/>
-              <a:t>:</a:t>
-            </a:r>
-            <a:r>
-              <a:rPr lang="pl-PL" sz="1800" dirty="0" smtClean="0"/>
-              <a:t/>
+            <a:r>
+              <a:rPr lang="pl-PL" sz="2200" dirty="0" smtClean="0"/>
+              <a:t>Uruchomiono wyświetlacz sterowany przez DSI</a:t>
+            </a:r>
+          </a:p>
+          <a:p>
+            <a:r>
+              <a:rPr lang="pl-PL" sz="2200" dirty="0" smtClean="0"/>
+              <a:t>Przedstawiono możliwości biblioteki LVGL</a:t>
+            </a:r>
+          </a:p>
+          <a:p>
+            <a:r>
+              <a:rPr lang="pl-PL" sz="2200" dirty="0" smtClean="0"/>
+              <a:t>Zaprezentowano program generator GUI – </a:t>
+            </a:r>
+            <a:r>
+              <a:rPr lang="pl-PL" sz="2200" dirty="0" err="1" smtClean="0"/>
+              <a:t>SquareLine</a:t>
+            </a:r>
+            <a:endParaRPr lang="pl-PL" sz="2200" dirty="0" smtClean="0"/>
+          </a:p>
+          <a:p>
+            <a:endParaRPr lang="pl-PL" sz="2200" dirty="0" smtClean="0"/>
+          </a:p>
+          <a:p>
+            <a:endParaRPr lang="pl-PL" sz="2200" dirty="0" smtClean="0"/>
+          </a:p>
+          <a:p>
+            <a:r>
+              <a:rPr lang="pl-PL" sz="2200" dirty="0" smtClean="0"/>
+              <a:t>Wspomniano/ pobieżnie omówiono o układy</a:t>
             </a:r>
             <a:br>
-              <a:rPr lang="pl-PL" sz="1800" dirty="0" smtClean="0"/>
+              <a:rPr lang="pl-PL" sz="2200" dirty="0" smtClean="0"/>
             </a:br>
             <a:r>
-              <a:rPr lang="pl-PL" sz="1800" dirty="0" smtClean="0">
-                <a:hlinkClick r:id="rId2"/>
-              </a:rPr>
-              <a:t>https</a:t>
-            </a:r>
-            <a:r>
-              <a:rPr lang="pl-PL" sz="1800" dirty="0" smtClean="0">
-                <a:hlinkClick r:id="rId2"/>
-              </a:rPr>
-              <a:t>://</a:t>
-            </a:r>
-            <a:r>
-              <a:rPr lang="pl-PL" sz="1800" dirty="0" smtClean="0">
-                <a:hlinkClick r:id="rId2"/>
-              </a:rPr>
-              <a:t>github.com/trteodor/stm32h747_disco_lvgl_bare_metal</a:t>
-            </a:r>
-            <a:r>
-              <a:rPr lang="pl-PL" sz="1800" dirty="0" smtClean="0"/>
-              <a:t> </a:t>
-            </a:r>
-          </a:p>
-          <a:p>
-            <a:pPr>
-              <a:buNone/>
-            </a:pPr>
-            <a:r>
-              <a:rPr lang="pl-PL" sz="1800" dirty="0" smtClean="0"/>
-              <a:t/>
-            </a:r>
-            <a:br>
-              <a:rPr lang="pl-PL" sz="1800" dirty="0" smtClean="0"/>
-            </a:br>
-            <a:r>
-              <a:rPr lang="pl-PL" sz="1800" b="1" dirty="0" err="1" smtClean="0"/>
-              <a:t>Free</a:t>
-            </a:r>
-            <a:r>
-              <a:rPr lang="pl-PL" sz="1800" b="1" dirty="0" smtClean="0"/>
-              <a:t> </a:t>
-            </a:r>
-            <a:r>
-              <a:rPr lang="pl-PL" sz="1800" b="1" dirty="0" err="1" smtClean="0"/>
-              <a:t>Icons</a:t>
-            </a:r>
-            <a:r>
-              <a:rPr lang="pl-PL" sz="1800" b="1" dirty="0" smtClean="0"/>
-              <a:t>:</a:t>
-            </a:r>
-            <a:r>
-              <a:rPr lang="pl-PL" sz="1800" dirty="0" smtClean="0"/>
-              <a:t/>
-            </a:r>
-            <a:br>
-              <a:rPr lang="pl-PL" sz="1800" dirty="0" smtClean="0"/>
-            </a:br>
-            <a:r>
-              <a:rPr lang="pl-PL" sz="1800" dirty="0" smtClean="0">
-                <a:hlinkClick r:id="rId3"/>
-              </a:rPr>
-              <a:t>https://</a:t>
-            </a:r>
-            <a:r>
-              <a:rPr lang="pl-PL" sz="1800" dirty="0" smtClean="0">
-                <a:hlinkClick r:id="rId3"/>
-              </a:rPr>
-              <a:t>all-free-download.com/free-icon/pack-jpeg.html</a:t>
-            </a:r>
-            <a:r>
-              <a:rPr lang="pl-PL" sz="1800" dirty="0" smtClean="0"/>
-              <a:t/>
-            </a:r>
-            <a:br>
-              <a:rPr lang="pl-PL" sz="1800" dirty="0" smtClean="0"/>
-            </a:br>
-            <a:r>
-              <a:rPr lang="pl-PL" sz="1800" dirty="0" smtClean="0"/>
-              <a:t/>
-            </a:r>
-            <a:br>
-              <a:rPr lang="pl-PL" sz="1800" dirty="0" smtClean="0"/>
-            </a:br>
-            <a:r>
-              <a:rPr lang="pl-PL" sz="1800" b="1" dirty="0" smtClean="0"/>
-              <a:t>Video demo:</a:t>
-            </a:r>
-            <a:r>
-              <a:rPr lang="pl-PL" sz="1800" dirty="0" smtClean="0"/>
-              <a:t/>
-            </a:r>
-            <a:br>
-              <a:rPr lang="pl-PL" sz="1800" dirty="0" smtClean="0"/>
-            </a:br>
-            <a:r>
-              <a:rPr lang="pl-PL" sz="1800" dirty="0" smtClean="0">
-                <a:hlinkClick r:id="rId4"/>
-              </a:rPr>
-              <a:t>https://youtu.be/5MxftdVXUOgd</a:t>
-            </a:r>
-            <a:endParaRPr lang="pl-PL" sz="1800" dirty="0"/>
-          </a:p>
-        </p:txBody>
-      </p:sp>
-      <p:pic>
-        <p:nvPicPr>
-          <p:cNvPr id="4" name="Picture 7" descr="D:\STM32_VSCodeWorkSpace\stm32h747_lvgl_master_start\Pictures\h747lvgl_Photo.jpg"/>
-          <p:cNvPicPr>
-            <a:picLocks noChangeAspect="1" noChangeArrowheads="1"/>
-          </p:cNvPicPr>
-          <p:nvPr/>
-        </p:nvPicPr>
-        <p:blipFill>
-          <a:blip r:embed="rId5" cstate="print"/>
-          <a:srcRect/>
-          <a:stretch>
-            <a:fillRect/>
-          </a:stretch>
-        </p:blipFill>
-        <p:spPr bwMode="auto">
-          <a:xfrm rot="2918870">
-            <a:off x="6022854" y="1156940"/>
-            <a:ext cx="2665556" cy="2025083"/>
-          </a:xfrm>
-          <a:prstGeom prst="rect">
-            <a:avLst/>
-          </a:prstGeom>
-          <a:noFill/>
-        </p:spPr>
-      </p:pic>
+              <a:rPr lang="pl-PL" sz="2200" dirty="0" smtClean="0"/>
+              <a:t>      SDRAM, QSPI, LTDC, DSI</a:t>
+            </a:r>
+            <a:endParaRPr lang="pl-PL" sz="2200" dirty="0"/>
+          </a:p>
+        </p:txBody>
+      </p:sp>
     </p:spTree>
   </p:cSld>
   <p:clrMapOvr>
@@ -4688,13 +4998,8 @@
             </a:r>
             <a:r>
               <a:rPr lang="pl-PL" dirty="0" smtClean="0"/>
-              <a:t> </a:t>
-            </a:r>
-            <a:r>
-              <a:rPr lang="pl-PL" dirty="0" smtClean="0"/>
-              <a:t>ST-LINK/V3</a:t>
-            </a:r>
-            <a:endParaRPr lang="pl-PL" dirty="0" smtClean="0"/>
+              <a:t> ST-LINK/V3</a:t>
+            </a:r>
           </a:p>
           <a:p>
             <a:r>
@@ -4797,7 +5102,7 @@
         </p:blipFill>
         <p:spPr bwMode="auto">
           <a:xfrm>
-            <a:off x="2116794" y="2571744"/>
+            <a:off x="2000232" y="2857496"/>
             <a:ext cx="7027206" cy="3857652"/>
           </a:xfrm>
           <a:prstGeom prst="rect">
@@ -4847,11 +5152,7 @@
             </a:pPr>
             <a:r>
               <a:rPr lang="pl-PL" dirty="0" smtClean="0"/>
-              <a:t> </a:t>
-            </a:r>
-            <a:r>
-              <a:rPr lang="pl-PL" dirty="0" smtClean="0"/>
-              <a:t>Generowanie kodu w języku C</a:t>
+              <a:t> Generowanie kodu w języku C</a:t>
             </a:r>
           </a:p>
           <a:p>
@@ -4876,11 +5177,7 @@
             </a:br>
             <a:r>
               <a:rPr lang="pl-PL" dirty="0" smtClean="0"/>
-              <a:t>	 – np. wywołanie niestandardowej </a:t>
-            </a:r>
-            <a:r>
-              <a:rPr lang="pl-PL" dirty="0" smtClean="0"/>
-              <a:t>funkcji</a:t>
+              <a:t>	 – np. wywołanie niestandardowej funkcji</a:t>
             </a:r>
           </a:p>
           <a:p>
@@ -4938,33 +5235,11 @@
             <p:ph type="title"/>
           </p:nvPr>
         </p:nvSpPr>
-        <p:spPr>
-          <a:xfrm>
-            <a:off x="428596" y="214290"/>
-            <a:ext cx="8229600" cy="1274786"/>
-          </a:xfrm>
-        </p:spPr>
-        <p:txBody>
-          <a:bodyPr>
-            <a:normAutofit fontScale="90000"/>
-          </a:bodyPr>
-          <a:lstStyle/>
-          <a:p>
-            <a:r>
-              <a:rPr lang="pl-PL" dirty="0" smtClean="0"/>
-              <a:t>Wyświetlacz OTM8009A</a:t>
-            </a:r>
-            <a:br>
-              <a:rPr lang="pl-PL" dirty="0" smtClean="0"/>
-            </a:br>
-            <a:r>
-              <a:rPr lang="pl-PL" dirty="0" err="1" smtClean="0"/>
-              <a:t>On-The-Board</a:t>
-            </a:r>
-            <a:r>
-              <a:rPr lang="pl-PL" dirty="0" smtClean="0"/>
-              <a:t> </a:t>
-            </a:r>
+        <p:spPr/>
+        <p:txBody>
+          <a:bodyPr/>
+          <a:lstStyle/>
+          <a:p>
             <a:r>
               <a:rPr lang="pl-PL" dirty="0" smtClean="0">
                 <a:solidFill>
@@ -4972,16 +5247,14 @@
                 </a:solidFill>
                 <a:latin typeface="Berlin Sans FB Demi" pitchFamily="34" charset="0"/>
               </a:rPr>
-              <a:t>STM32H747-Discovery</a:t>
-            </a:r>
-            <a:r>
-              <a:rPr lang="pl-PL" dirty="0" smtClean="0"/>
-              <a:t/>
-            </a:r>
-            <a:br>
-              <a:rPr lang="pl-PL" dirty="0" smtClean="0"/>
-            </a:br>
-            <a:endParaRPr lang="pl-PL" dirty="0"/>
+              <a:t>MCU - STM32H747</a:t>
+            </a:r>
+            <a:endParaRPr lang="pl-PL" dirty="0">
+              <a:solidFill>
+                <a:srgbClr val="EE208C"/>
+              </a:solidFill>
+              <a:latin typeface="Berlin Sans FB Demi" pitchFamily="34" charset="0"/>
+            </a:endParaRPr>
           </a:p>
         </p:txBody>
       </p:sp>
@@ -5000,7 +5273,7 @@
           <a:bodyPr/>
           <a:lstStyle/>
           <a:p>
-            <a:endParaRPr lang="pl-PL" dirty="0"/>
+            <a:endParaRPr lang="pl-PL"/>
           </a:p>
         </p:txBody>
       </p:sp>
@@ -5039,7 +5312,12 @@
             <p:ph type="title"/>
           </p:nvPr>
         </p:nvSpPr>
-        <p:spPr/>
+        <p:spPr>
+          <a:xfrm>
+            <a:off x="428596" y="214290"/>
+            <a:ext cx="8229600" cy="1274786"/>
+          </a:xfrm>
+        </p:spPr>
         <p:txBody>
           <a:bodyPr>
             <a:normAutofit fontScale="90000"/>
@@ -5048,7 +5326,35 @@
           <a:p>
             <a:r>
               <a:rPr lang="pl-PL" dirty="0" smtClean="0"/>
-              <a:t>LTDC</a:t>
+              <a:t>Sterownik wyświetlacza OTM8009A</a:t>
+            </a:r>
+            <a:r>
+              <a:rPr lang="pl-PL" dirty="0" smtClean="0"/>
+              <a:t/>
+            </a:r>
+            <a:br>
+              <a:rPr lang="pl-PL" dirty="0" smtClean="0"/>
+            </a:br>
+            <a:r>
+              <a:rPr lang="pl-PL" dirty="0" err="1" smtClean="0"/>
+              <a:t>On-The-Board</a:t>
+            </a:r>
+            <a:r>
+              <a:rPr lang="pl-PL" dirty="0" smtClean="0"/>
+              <a:t> </a:t>
+            </a:r>
+            <a:r>
+              <a:rPr lang="pl-PL" dirty="0" smtClean="0">
+                <a:solidFill>
+                  <a:srgbClr val="EE208C"/>
+                </a:solidFill>
+                <a:latin typeface="Berlin Sans FB Demi" pitchFamily="34" charset="0"/>
+              </a:rPr>
+              <a:t>STM32H747-Discovery</a:t>
+            </a:r>
+            <a:r>
+              <a:rPr lang="pl-PL" dirty="0" smtClean="0"/>
+              <a:t/>
             </a:r>
             <a:br>
               <a:rPr lang="pl-PL" dirty="0" smtClean="0"/>
@@ -5072,7 +5378,7 @@
           <a:bodyPr/>
           <a:lstStyle/>
           <a:p>
-            <a:endParaRPr lang="pl-PL"/>
+            <a:endParaRPr lang="pl-PL" dirty="0"/>
           </a:p>
         </p:txBody>
       </p:sp>
@@ -5118,7 +5424,15 @@
           <a:p>
             <a:r>
               <a:rPr lang="pl-PL" dirty="0" smtClean="0"/>
-              <a:t>DSI</a:t>
+              <a:t>Display serial </a:t>
+            </a:r>
+            <a:r>
+              <a:rPr lang="pl-PL" dirty="0" err="1" smtClean="0"/>
+              <a:t>interface</a:t>
+            </a:r>
+            <a:r>
+              <a:rPr lang="pl-PL" dirty="0" smtClean="0"/>
+              <a:t> (DSI)</a:t>
             </a:r>
             <a:endParaRPr lang="pl-PL" dirty="0"/>
           </a:p>
@@ -5178,38 +5492,73 @@
             <p:ph type="title"/>
           </p:nvPr>
         </p:nvSpPr>
-        <p:spPr/>
-        <p:txBody>
-          <a:bodyPr/>
-          <a:lstStyle/>
-          <a:p>
-            <a:r>
-              <a:rPr lang="pl-PL" dirty="0" smtClean="0"/>
-              <a:t>SDRAM</a:t>
+        <p:spPr>
+          <a:xfrm>
+            <a:off x="457200" y="274638"/>
+            <a:ext cx="8229600" cy="1225536"/>
+          </a:xfrm>
+        </p:spPr>
+        <p:txBody>
+          <a:bodyPr>
+            <a:normAutofit/>
+          </a:bodyPr>
+          <a:lstStyle/>
+          <a:p>
+            <a:r>
+              <a:rPr lang="pl-PL" b="1" dirty="0" err="1" smtClean="0"/>
+              <a:t>LCD-TFT</a:t>
+            </a:r>
+            <a:r>
+              <a:rPr lang="pl-PL" b="1" dirty="0" smtClean="0"/>
+              <a:t> display </a:t>
+            </a:r>
+            <a:r>
+              <a:rPr lang="pl-PL" b="1" dirty="0" err="1" smtClean="0"/>
+              <a:t>controller</a:t>
+            </a:r>
+            <a:r>
+              <a:rPr lang="pl-PL" b="1" dirty="0" smtClean="0"/>
+              <a:t> (LTDC)</a:t>
             </a:r>
             <a:endParaRPr lang="pl-PL" dirty="0"/>
           </a:p>
         </p:txBody>
       </p:sp>
-      <p:sp>
-        <p:nvSpPr>
-          <p:cNvPr id="3" name="Symbol zastępczy zawartości 2"/>
-          <p:cNvSpPr>
-            <a:spLocks noGrp="1"/>
-          </p:cNvSpPr>
+      <p:pic>
+        <p:nvPicPr>
+          <p:cNvPr id="1026" name="Picture 2"/>
+          <p:cNvPicPr>
+            <a:picLocks noGrp="1" noChangeAspect="1" noChangeArrowheads="1"/>
+          </p:cNvPicPr>
           <p:nvPr>
             <p:ph idx="1"/>
           </p:nvPr>
-        </p:nvSpPr>
-        <p:spPr/>
-        <p:txBody>
-          <a:bodyPr/>
-          <a:lstStyle/>
-          <a:p>
-            <a:endParaRPr lang="pl-PL"/>
-          </a:p>
-        </p:txBody>
-      </p:sp>
+        </p:nvPicPr>
+        <p:blipFill>
+          <a:blip r:embed="rId2"/>
+          <a:srcRect/>
+          <a:stretch>
+            <a:fillRect/>
+          </a:stretch>
+        </p:blipFill>
+        <p:spPr bwMode="auto">
+          <a:xfrm>
+            <a:off x="2214546" y="1643050"/>
+            <a:ext cx="6264429" cy="4483100"/>
+          </a:xfrm>
+          <a:prstGeom prst="rect">
+            <a:avLst/>
+          </a:prstGeom>
+          <a:noFill/>
+          <a:ln w="9525">
+            <a:noFill/>
+            <a:miter lim="800000"/>
+            <a:headEnd/>
+            <a:tailEnd/>
+          </a:ln>
+          <a:effectLst/>
+        </p:spPr>
+      </p:pic>
     </p:spTree>
   </p:cSld>
   <p:clrMapOvr>
@@ -5248,57 +5597,69 @@
         <p:spPr/>
         <p:txBody>
           <a:bodyPr>
-            <a:normAutofit fontScale="90000"/>
+            <a:normAutofit/>
           </a:bodyPr>
           <a:lstStyle/>
           <a:p>
             <a:r>
-              <a:rPr lang="pl-PL" dirty="0" smtClean="0"/>
-              <a:t>QSPI – </a:t>
-            </a:r>
-            <a:r>
-              <a:rPr lang="pl-PL" dirty="0" err="1" smtClean="0"/>
-              <a:t>Quad</a:t>
-            </a:r>
-            <a:r>
-              <a:rPr lang="pl-PL" dirty="0" smtClean="0"/>
-              <a:t> Serial </a:t>
-            </a:r>
-            <a:r>
-              <a:rPr lang="pl-PL" dirty="0" err="1" smtClean="0"/>
-              <a:t>periph</a:t>
-            </a:r>
-            <a:r>
-              <a:rPr lang="pl-PL" dirty="0" smtClean="0"/>
-              <a:t>. </a:t>
-            </a:r>
-            <a:r>
-              <a:rPr lang="pl-PL" dirty="0" err="1" smtClean="0"/>
-              <a:t>interface</a:t>
+              <a:rPr lang="pl-PL" b="1" dirty="0" err="1" smtClean="0"/>
+              <a:t>LCD-TFT</a:t>
+            </a:r>
+            <a:r>
+              <a:rPr lang="pl-PL" b="1" dirty="0" smtClean="0"/>
+              <a:t> display </a:t>
+            </a:r>
+            <a:r>
+              <a:rPr lang="pl-PL" b="1" dirty="0" err="1" smtClean="0"/>
+              <a:t>controller</a:t>
+            </a:r>
+            <a:r>
+              <a:rPr lang="pl-PL" b="1" dirty="0" smtClean="0"/>
+              <a:t> (LTDC</a:t>
+            </a:r>
+            <a:r>
+              <a:rPr lang="pl-PL" b="1" dirty="0" smtClean="0"/>
+              <a:t>)</a:t>
             </a:r>
             <a:endParaRPr lang="pl-PL" dirty="0"/>
           </a:p>
         </p:txBody>
       </p:sp>
-      <p:sp>
-        <p:nvSpPr>
-          <p:cNvPr id="3" name="Symbol zastępczy zawartości 2"/>
-          <p:cNvSpPr>
-            <a:spLocks noGrp="1"/>
-          </p:cNvSpPr>
+      <p:pic>
+        <p:nvPicPr>
+          <p:cNvPr id="2050" name="Picture 2"/>
+          <p:cNvPicPr>
+            <a:picLocks noGrp="1" noChangeAspect="1" noChangeArrowheads="1"/>
+          </p:cNvPicPr>
           <p:nvPr>
             <p:ph idx="1"/>
           </p:nvPr>
-        </p:nvSpPr>
-        <p:spPr/>
-        <p:txBody>
-          <a:bodyPr/>
-          <a:lstStyle/>
-          <a:p>
-            <a:endParaRPr lang="pl-PL"/>
-          </a:p>
-        </p:txBody>
-      </p:sp>
+        </p:nvPicPr>
+        <p:blipFill>
+          <a:blip r:embed="rId2"/>
+          <a:srcRect/>
+          <a:stretch>
+            <a:fillRect/>
+          </a:stretch>
+        </p:blipFill>
+        <p:spPr bwMode="auto">
+          <a:xfrm>
+            <a:off x="457200" y="2101079"/>
+            <a:ext cx="8229600" cy="3524205"/>
+          </a:xfrm>
+          <a:prstGeom prst="rect">
+            <a:avLst/>
+          </a:prstGeom>
+          <a:noFill/>
+          <a:ln w="9525">
+            <a:noFill/>
+            <a:miter lim="800000"/>
+            <a:headEnd/>
+            <a:tailEnd/>
+          </a:ln>
+          <a:effectLst/>
+        </p:spPr>
+      </p:pic>
     </p:spTree>
   </p:cSld>
   <p:clrMapOvr>
@@ -5340,34 +5701,10 @@
           <a:lstStyle/>
           <a:p>
             <a:r>
-              <a:rPr lang="pl-PL" dirty="0" err="1" smtClean="0">
-                <a:solidFill>
-                  <a:srgbClr val="7C7F07"/>
-                </a:solidFill>
-              </a:rPr>
-              <a:t>DLTuc</a:t>
-            </a:r>
-            <a:r>
-              <a:rPr lang="pl-PL" dirty="0" smtClean="0">
-                <a:solidFill>
-                  <a:srgbClr val="7C7F07"/>
-                </a:solidFill>
-              </a:rPr>
-              <a:t> </a:t>
-            </a:r>
-            <a:r>
-              <a:rPr lang="pl-PL" dirty="0" err="1" smtClean="0">
-                <a:solidFill>
-                  <a:srgbClr val="7C7F07"/>
-                </a:solidFill>
-              </a:rPr>
-              <a:t>Library</a:t>
-            </a:r>
-            <a:endParaRPr lang="pl-PL" dirty="0">
-              <a:solidFill>
-                <a:srgbClr val="7C7F07"/>
-              </a:solidFill>
-            </a:endParaRPr>
+              <a:rPr lang="pl-PL" dirty="0" smtClean="0"/>
+              <a:t>SDRAM</a:t>
+            </a:r>
+            <a:endParaRPr lang="pl-PL" dirty="0"/>
           </a:p>
         </p:txBody>
       </p:sp>
@@ -5381,107 +5718,12 @@
             <p:ph idx="1"/>
           </p:nvPr>
         </p:nvSpPr>
-        <p:spPr>
-          <a:xfrm>
-            <a:off x="357158" y="2857496"/>
-            <a:ext cx="8229600" cy="642942"/>
-          </a:xfrm>
-        </p:spPr>
-        <p:txBody>
-          <a:bodyPr>
-            <a:normAutofit/>
-          </a:bodyPr>
-          <a:lstStyle/>
-          <a:p>
-            <a:pPr>
-              <a:buNone/>
-            </a:pPr>
-            <a:r>
-              <a:rPr lang="pl-PL" dirty="0" smtClean="0">
-                <a:hlinkClick r:id="rId2"/>
-              </a:rPr>
-              <a:t>https</a:t>
-            </a:r>
-            <a:r>
-              <a:rPr lang="pl-PL" dirty="0" smtClean="0">
-                <a:hlinkClick r:id="rId2"/>
-              </a:rPr>
-              <a:t>://</a:t>
-            </a:r>
-            <a:r>
-              <a:rPr lang="pl-PL" dirty="0" smtClean="0">
-                <a:hlinkClick r:id="rId2"/>
-              </a:rPr>
-              <a:t>youtu.be/WWnudktQlP0</a:t>
-            </a:r>
-            <a:r>
-              <a:rPr lang="pl-PL" dirty="0" smtClean="0"/>
-              <a:t> </a:t>
-            </a:r>
-            <a:endParaRPr lang="pl-PL" dirty="0"/>
-          </a:p>
-        </p:txBody>
-      </p:sp>
-      <p:pic>
-        <p:nvPicPr>
-          <p:cNvPr id="3075" name="Picture 3"/>
-          <p:cNvPicPr>
-            <a:picLocks noChangeAspect="1" noChangeArrowheads="1"/>
-          </p:cNvPicPr>
-          <p:nvPr/>
-        </p:nvPicPr>
-        <p:blipFill>
-          <a:blip r:embed="rId3"/>
-          <a:srcRect/>
-          <a:stretch>
-            <a:fillRect/>
-          </a:stretch>
-        </p:blipFill>
-        <p:spPr bwMode="auto">
-          <a:xfrm>
-            <a:off x="928662" y="3571876"/>
-            <a:ext cx="6154737" cy="2209800"/>
-          </a:xfrm>
-          <a:prstGeom prst="rect">
-            <a:avLst/>
-          </a:prstGeom>
-          <a:noFill/>
-          <a:ln w="9525">
-            <a:noFill/>
-            <a:miter lim="800000"/>
-            <a:headEnd/>
-            <a:tailEnd/>
-          </a:ln>
-          <a:effectLst/>
-        </p:spPr>
-      </p:pic>
-      <p:sp>
-        <p:nvSpPr>
-          <p:cNvPr id="6" name="pole tekstowe 5"/>
-          <p:cNvSpPr txBox="1"/>
-          <p:nvPr/>
-        </p:nvSpPr>
-        <p:spPr>
-          <a:xfrm>
-            <a:off x="357158" y="2285992"/>
-            <a:ext cx="6643734" cy="369332"/>
-          </a:xfrm>
-          <a:prstGeom prst="rect">
-            <a:avLst/>
-          </a:prstGeom>
-          <a:noFill/>
-        </p:spPr>
-        <p:txBody>
-          <a:bodyPr wrap="square" rtlCol="0">
-            <a:spAutoFit/>
-          </a:bodyPr>
-          <a:lstStyle/>
-          <a:p>
-            <a:r>
-              <a:rPr lang="pl-PL" smtClean="0"/>
-              <a:t>Uproszczenie procesu rozwoju oprogramowania wbudowanego</a:t>
-            </a:r>
-            <a:endParaRPr lang="pl-PL" dirty="0" smtClean="0"/>
+        <p:spPr/>
+        <p:txBody>
+          <a:bodyPr/>
+          <a:lstStyle/>
+          <a:p>
+            <a:endParaRPr lang="pl-PL"/>
           </a:p>
         </p:txBody>
       </p:sp>

</xml_diff>